<commit_message>
add secret to reviews db
</commit_message>
<xml_diff>
--- a/sample-app/bulletinboard-in-k8s_exercises.pptx
+++ b/sample-app/bulletinboard-in-k8s_exercises.pptx
@@ -19654,7 +19654,9 @@
               <a:prstGeom prst="roundRect">
                 <a:avLst/>
               </a:prstGeom>
-              <a:grpFill/>
+              <a:solidFill>
+                <a:srgbClr val="4CC5FF"/>
+              </a:solidFill>
               <a:ln>
                 <a:solidFill>
                   <a:schemeClr val="tx1"/>
@@ -19878,7 +19880,7 @@
                     <a:ea typeface="Arial Unicode MS" pitchFamily="34" charset="-128"/>
                     <a:cs typeface="Arial Unicode MS" pitchFamily="34" charset="-128"/>
                   </a:rPr>
-                  <a:t>cm</a:t>
+                  <a:t>sec</a:t>
                 </a:r>
               </a:p>
             </p:txBody>
@@ -21469,6 +21471,299 @@
             </a:fontRef>
           </p:style>
         </p:cxnSp>
+      </p:grpSp>
+      <p:grpSp>
+        <p:nvGrpSpPr>
+          <p:cNvPr id="110" name="Group 109">
+            <a:extLst>
+              <a:ext uri="{FF2B5EF4-FFF2-40B4-BE49-F238E27FC236}">
+                <a16:creationId xmlns:a16="http://schemas.microsoft.com/office/drawing/2014/main" id="{5049C088-7F76-463B-B39E-CA39305B464B}"/>
+              </a:ext>
+            </a:extLst>
+          </p:cNvPr>
+          <p:cNvGrpSpPr/>
+          <p:nvPr/>
+        </p:nvGrpSpPr>
+        <p:grpSpPr>
+          <a:xfrm>
+            <a:off x="8361345" y="5460150"/>
+            <a:ext cx="643122" cy="358399"/>
+            <a:chOff x="2819071" y="4941991"/>
+            <a:chExt cx="643122" cy="358399"/>
+          </a:xfrm>
+        </p:grpSpPr>
+        <p:cxnSp>
+          <p:nvCxnSpPr>
+            <p:cNvPr id="111" name="Straight Connector 110">
+              <a:extLst>
+                <a:ext uri="{FF2B5EF4-FFF2-40B4-BE49-F238E27FC236}">
+                  <a16:creationId xmlns:a16="http://schemas.microsoft.com/office/drawing/2014/main" id="{E6C0D9E3-B7BE-4847-AF62-82E6032A01C9}"/>
+                </a:ext>
+              </a:extLst>
+            </p:cNvPr>
+            <p:cNvCxnSpPr>
+              <a:cxnSpLocks/>
+            </p:cNvCxnSpPr>
+            <p:nvPr/>
+          </p:nvCxnSpPr>
+          <p:spPr>
+            <a:xfrm>
+              <a:off x="3362585" y="5142991"/>
+              <a:ext cx="99608" cy="0"/>
+            </a:xfrm>
+            <a:prstGeom prst="line">
+              <a:avLst/>
+            </a:prstGeom>
+            <a:ln w="9525">
+              <a:solidFill>
+                <a:schemeClr val="tx1"/>
+              </a:solidFill>
+              <a:headEnd type="none" w="med" len="med"/>
+              <a:tailEnd type="none" w="med" len="med"/>
+            </a:ln>
+          </p:spPr>
+          <p:style>
+            <a:lnRef idx="1">
+              <a:schemeClr val="accent1"/>
+            </a:lnRef>
+            <a:fillRef idx="0">
+              <a:schemeClr val="accent1"/>
+            </a:fillRef>
+            <a:effectRef idx="0">
+              <a:schemeClr val="accent1"/>
+            </a:effectRef>
+            <a:fontRef idx="minor">
+              <a:schemeClr val="tx1"/>
+            </a:fontRef>
+          </p:style>
+        </p:cxnSp>
+        <p:sp>
+          <p:nvSpPr>
+            <p:cNvPr id="112" name="Rounded Rectangle 14">
+              <a:extLst>
+                <a:ext uri="{FF2B5EF4-FFF2-40B4-BE49-F238E27FC236}">
+                  <a16:creationId xmlns:a16="http://schemas.microsoft.com/office/drawing/2014/main" id="{13E54437-5B1F-424F-8630-CD1E3FAEB69F}"/>
+                </a:ext>
+              </a:extLst>
+            </p:cNvPr>
+            <p:cNvSpPr/>
+            <p:nvPr/>
+          </p:nvSpPr>
+          <p:spPr bwMode="gray">
+            <a:xfrm>
+              <a:off x="2819071" y="5005920"/>
+              <a:ext cx="548827" cy="294470"/>
+            </a:xfrm>
+            <a:prstGeom prst="roundRect">
+              <a:avLst/>
+            </a:prstGeom>
+            <a:solidFill>
+              <a:schemeClr val="accent3">
+                <a:lumMod val="20000"/>
+                <a:lumOff val="80000"/>
+              </a:schemeClr>
+            </a:solidFill>
+            <a:ln>
+              <a:solidFill>
+                <a:schemeClr val="tx1"/>
+              </a:solidFill>
+              <a:headEnd/>
+              <a:tailEnd/>
+            </a:ln>
+            <a:effectLst/>
+          </p:spPr>
+          <p:style>
+            <a:lnRef idx="1">
+              <a:schemeClr val="accent1"/>
+            </a:lnRef>
+            <a:fillRef idx="3">
+              <a:schemeClr val="accent1"/>
+            </a:fillRef>
+            <a:effectRef idx="2">
+              <a:schemeClr val="accent1"/>
+            </a:effectRef>
+            <a:fontRef idx="minor">
+              <a:schemeClr val="lt1"/>
+            </a:fontRef>
+          </p:style>
+          <p:txBody>
+            <a:bodyPr lIns="107138" tIns="85710" rIns="107138" bIns="85710" rtlCol="0" anchor="t" anchorCtr="0"/>
+            <a:lstStyle>
+              <a:defPPr>
+                <a:defRPr lang="de-DE"/>
+              </a:defPPr>
+              <a:lvl1pPr marL="0" algn="l" defTabSz="1088776" rtl="0" eaLnBrk="1" latinLnBrk="0" hangingPunct="1">
+                <a:defRPr lang="de-DE" sz="2100" kern="1200">
+                  <a:solidFill>
+                    <a:schemeClr val="lt1"/>
+                  </a:solidFill>
+                  <a:latin typeface="+mn-lt"/>
+                  <a:ea typeface="+mn-ea"/>
+                  <a:cs typeface="+mn-cs"/>
+                </a:defRPr>
+              </a:lvl1pPr>
+              <a:lvl2pPr marL="544388" algn="l" defTabSz="1088776" rtl="0" eaLnBrk="1" latinLnBrk="0" hangingPunct="1">
+                <a:buClr>
+                  <a:srgbClr val="FDB913"/>
+                </a:buClr>
+                <a:buSzPct val="100000"/>
+                <a:buFont typeface="wingdings"/>
+                <a:buChar char=""/>
+                <a:defRPr lang="de-DE" sz="2100" kern="1200">
+                  <a:solidFill>
+                    <a:schemeClr val="lt1"/>
+                  </a:solidFill>
+                  <a:latin typeface="+mn-lt"/>
+                  <a:ea typeface="+mn-ea"/>
+                  <a:cs typeface="+mn-cs"/>
+                </a:defRPr>
+              </a:lvl2pPr>
+              <a:lvl3pPr marL="1088776" algn="l" defTabSz="1088776" rtl="0" eaLnBrk="1" latinLnBrk="0" hangingPunct="1">
+                <a:buClr>
+                  <a:srgbClr val="666666"/>
+                </a:buClr>
+                <a:buSzPct val="80000"/>
+                <a:buFont typeface="Wingdings"/>
+                <a:buChar char="n"/>
+                <a:defRPr lang="de-DE" sz="1700" kern="1200">
+                  <a:solidFill>
+                    <a:schemeClr val="lt1"/>
+                  </a:solidFill>
+                  <a:latin typeface="+mn-lt"/>
+                  <a:ea typeface="+mn-ea"/>
+                  <a:cs typeface="+mn-cs"/>
+                </a:defRPr>
+              </a:lvl3pPr>
+              <a:lvl4pPr marL="1633164" algn="l" defTabSz="1088776" rtl="0" eaLnBrk="1" latinLnBrk="0" hangingPunct="1">
+                <a:buClr>
+                  <a:srgbClr val="666666"/>
+                </a:buClr>
+                <a:buSzPct val="80000"/>
+                <a:buFont typeface="Arial"/>
+                <a:buChar char=""/>
+                <a:defRPr lang="de-DE" sz="1400" kern="1200">
+                  <a:solidFill>
+                    <a:schemeClr val="lt1"/>
+                  </a:solidFill>
+                  <a:latin typeface="+mn-lt"/>
+                  <a:ea typeface="+mn-ea"/>
+                  <a:cs typeface="+mn-cs"/>
+                </a:defRPr>
+              </a:lvl4pPr>
+              <a:lvl5pPr marL="2177552" algn="l" defTabSz="1088776" rtl="0" eaLnBrk="1" latinLnBrk="0" hangingPunct="1">
+                <a:buClr>
+                  <a:srgbClr val="666666"/>
+                </a:buClr>
+                <a:buSzPct val="80000"/>
+                <a:buFont typeface="Arial"/>
+                <a:buChar char=""/>
+                <a:defRPr lang="de-DE" sz="1200" kern="1200">
+                  <a:solidFill>
+                    <a:schemeClr val="lt1"/>
+                  </a:solidFill>
+                  <a:latin typeface="+mn-lt"/>
+                  <a:ea typeface="+mn-ea"/>
+                  <a:cs typeface="+mn-cs"/>
+                </a:defRPr>
+              </a:lvl5pPr>
+              <a:lvl6pPr marL="2721940" algn="l" defTabSz="1088776" rtl="0" eaLnBrk="1" latinLnBrk="0" hangingPunct="1">
+                <a:defRPr sz="2100" kern="1200">
+                  <a:solidFill>
+                    <a:schemeClr val="lt1"/>
+                  </a:solidFill>
+                  <a:latin typeface="+mn-lt"/>
+                  <a:ea typeface="+mn-ea"/>
+                  <a:cs typeface="+mn-cs"/>
+                </a:defRPr>
+              </a:lvl6pPr>
+              <a:lvl7pPr marL="3266328" algn="l" defTabSz="1088776" rtl="0" eaLnBrk="1" latinLnBrk="0" hangingPunct="1">
+                <a:defRPr sz="2100" kern="1200">
+                  <a:solidFill>
+                    <a:schemeClr val="lt1"/>
+                  </a:solidFill>
+                  <a:latin typeface="+mn-lt"/>
+                  <a:ea typeface="+mn-ea"/>
+                  <a:cs typeface="+mn-cs"/>
+                </a:defRPr>
+              </a:lvl7pPr>
+              <a:lvl8pPr marL="3810716" algn="l" defTabSz="1088776" rtl="0" eaLnBrk="1" latinLnBrk="0" hangingPunct="1">
+                <a:defRPr sz="2100" kern="1200">
+                  <a:solidFill>
+                    <a:schemeClr val="lt1"/>
+                  </a:solidFill>
+                  <a:latin typeface="+mn-lt"/>
+                  <a:ea typeface="+mn-ea"/>
+                  <a:cs typeface="+mn-cs"/>
+                </a:defRPr>
+              </a:lvl8pPr>
+              <a:lvl9pPr marL="4355104" algn="l" defTabSz="1088776" rtl="0" eaLnBrk="1" latinLnBrk="0" hangingPunct="1">
+                <a:defRPr sz="2100" kern="1200">
+                  <a:solidFill>
+                    <a:schemeClr val="lt1"/>
+                  </a:solidFill>
+                  <a:latin typeface="+mn-lt"/>
+                  <a:ea typeface="+mn-ea"/>
+                  <a:cs typeface="+mn-cs"/>
+                </a:defRPr>
+              </a:lvl9pPr>
+            </a:lstStyle>
+            <a:p>
+              <a:pPr algn="ctr" defTabSz="1088558" fontAlgn="base">
+                <a:spcBef>
+                  <a:spcPct val="50000"/>
+                </a:spcBef>
+                <a:spcAft>
+                  <a:spcPct val="0"/>
+                </a:spcAft>
+                <a:buClr>
+                  <a:srgbClr val="F0AB00"/>
+                </a:buClr>
+                <a:buSzPct val="80000"/>
+              </a:pPr>
+              <a:r>
+                <a:rPr lang="en-US" sz="1000" kern="0" dirty="0">
+                  <a:solidFill>
+                    <a:srgbClr val="000000"/>
+                  </a:solidFill>
+                  <a:latin typeface="Arial"/>
+                  <a:ea typeface="Arial Unicode MS" pitchFamily="34" charset="-128"/>
+                  <a:cs typeface="Arial Unicode MS" pitchFamily="34" charset="-128"/>
+                </a:rPr>
+                <a:t>sec</a:t>
+              </a:r>
+            </a:p>
+          </p:txBody>
+        </p:sp>
+        <p:pic>
+          <p:nvPicPr>
+            <p:cNvPr id="114" name="Picture 113">
+              <a:extLst>
+                <a:ext uri="{FF2B5EF4-FFF2-40B4-BE49-F238E27FC236}">
+                  <a16:creationId xmlns:a16="http://schemas.microsoft.com/office/drawing/2014/main" id="{1D68ABF0-C50F-4A05-8EE1-AFD371C9A2E7}"/>
+                </a:ext>
+              </a:extLst>
+            </p:cNvPr>
+            <p:cNvPicPr>
+              <a:picLocks noChangeAspect="1"/>
+            </p:cNvPicPr>
+            <p:nvPr/>
+          </p:nvPicPr>
+          <p:blipFill>
+            <a:blip r:embed="rId3"/>
+            <a:stretch>
+              <a:fillRect/>
+            </a:stretch>
+          </p:blipFill>
+          <p:spPr>
+            <a:xfrm>
+              <a:off x="3290175" y="4941991"/>
+              <a:ext cx="150305" cy="146304"/>
+            </a:xfrm>
+            <a:prstGeom prst="rect">
+              <a:avLst/>
+            </a:prstGeom>
+          </p:spPr>
+        </p:pic>
       </p:grpSp>
     </p:spTree>
     <p:extLst>
@@ -25323,7 +25618,9 @@
             <a:prstGeom prst="roundRect">
               <a:avLst/>
             </a:prstGeom>
-            <a:grpFill/>
+            <a:solidFill>
+              <a:srgbClr val="4CC5FF"/>
+            </a:solidFill>
             <a:ln>
               <a:solidFill>
                 <a:schemeClr val="tx1"/>
@@ -25547,7 +25844,7 @@
                   <a:ea typeface="Arial Unicode MS" pitchFamily="34" charset="-128"/>
                   <a:cs typeface="Arial Unicode MS" pitchFamily="34" charset="-128"/>
                 </a:rPr>
-                <a:t>cm</a:t>
+                <a:t>sec</a:t>
               </a:r>
             </a:p>
           </p:txBody>
@@ -27399,6 +27696,299 @@
           </a:p>
         </p:txBody>
       </p:sp>
+      <p:grpSp>
+        <p:nvGrpSpPr>
+          <p:cNvPr id="115" name="Group 114">
+            <a:extLst>
+              <a:ext uri="{FF2B5EF4-FFF2-40B4-BE49-F238E27FC236}">
+                <a16:creationId xmlns:a16="http://schemas.microsoft.com/office/drawing/2014/main" id="{BFD75DAC-6AD6-4057-B83A-8E4BA0193D66}"/>
+              </a:ext>
+            </a:extLst>
+          </p:cNvPr>
+          <p:cNvGrpSpPr/>
+          <p:nvPr/>
+        </p:nvGrpSpPr>
+        <p:grpSpPr>
+          <a:xfrm>
+            <a:off x="8361345" y="5466728"/>
+            <a:ext cx="643122" cy="358399"/>
+            <a:chOff x="2819071" y="4941991"/>
+            <a:chExt cx="643122" cy="358399"/>
+          </a:xfrm>
+        </p:grpSpPr>
+        <p:cxnSp>
+          <p:nvCxnSpPr>
+            <p:cNvPr id="117" name="Straight Connector 116">
+              <a:extLst>
+                <a:ext uri="{FF2B5EF4-FFF2-40B4-BE49-F238E27FC236}">
+                  <a16:creationId xmlns:a16="http://schemas.microsoft.com/office/drawing/2014/main" id="{2536B654-40EB-4FD9-A960-2DC1F36B8BA1}"/>
+                </a:ext>
+              </a:extLst>
+            </p:cNvPr>
+            <p:cNvCxnSpPr>
+              <a:cxnSpLocks/>
+            </p:cNvCxnSpPr>
+            <p:nvPr/>
+          </p:nvCxnSpPr>
+          <p:spPr>
+            <a:xfrm>
+              <a:off x="3362585" y="5142991"/>
+              <a:ext cx="99608" cy="0"/>
+            </a:xfrm>
+            <a:prstGeom prst="line">
+              <a:avLst/>
+            </a:prstGeom>
+            <a:ln w="9525">
+              <a:solidFill>
+                <a:schemeClr val="tx1"/>
+              </a:solidFill>
+              <a:headEnd type="none" w="med" len="med"/>
+              <a:tailEnd type="none" w="med" len="med"/>
+            </a:ln>
+          </p:spPr>
+          <p:style>
+            <a:lnRef idx="1">
+              <a:schemeClr val="accent1"/>
+            </a:lnRef>
+            <a:fillRef idx="0">
+              <a:schemeClr val="accent1"/>
+            </a:fillRef>
+            <a:effectRef idx="0">
+              <a:schemeClr val="accent1"/>
+            </a:effectRef>
+            <a:fontRef idx="minor">
+              <a:schemeClr val="tx1"/>
+            </a:fontRef>
+          </p:style>
+        </p:cxnSp>
+        <p:sp>
+          <p:nvSpPr>
+            <p:cNvPr id="122" name="Rounded Rectangle 14">
+              <a:extLst>
+                <a:ext uri="{FF2B5EF4-FFF2-40B4-BE49-F238E27FC236}">
+                  <a16:creationId xmlns:a16="http://schemas.microsoft.com/office/drawing/2014/main" id="{37467063-03BE-43E4-A648-108302D1E15A}"/>
+                </a:ext>
+              </a:extLst>
+            </p:cNvPr>
+            <p:cNvSpPr/>
+            <p:nvPr/>
+          </p:nvSpPr>
+          <p:spPr bwMode="gray">
+            <a:xfrm>
+              <a:off x="2819071" y="5005920"/>
+              <a:ext cx="548827" cy="294470"/>
+            </a:xfrm>
+            <a:prstGeom prst="roundRect">
+              <a:avLst/>
+            </a:prstGeom>
+            <a:solidFill>
+              <a:schemeClr val="accent3">
+                <a:lumMod val="20000"/>
+                <a:lumOff val="80000"/>
+              </a:schemeClr>
+            </a:solidFill>
+            <a:ln>
+              <a:solidFill>
+                <a:schemeClr val="tx1"/>
+              </a:solidFill>
+              <a:headEnd/>
+              <a:tailEnd/>
+            </a:ln>
+            <a:effectLst/>
+          </p:spPr>
+          <p:style>
+            <a:lnRef idx="1">
+              <a:schemeClr val="accent1"/>
+            </a:lnRef>
+            <a:fillRef idx="3">
+              <a:schemeClr val="accent1"/>
+            </a:fillRef>
+            <a:effectRef idx="2">
+              <a:schemeClr val="accent1"/>
+            </a:effectRef>
+            <a:fontRef idx="minor">
+              <a:schemeClr val="lt1"/>
+            </a:fontRef>
+          </p:style>
+          <p:txBody>
+            <a:bodyPr lIns="107138" tIns="85710" rIns="107138" bIns="85710" rtlCol="0" anchor="t" anchorCtr="0"/>
+            <a:lstStyle>
+              <a:defPPr>
+                <a:defRPr lang="de-DE"/>
+              </a:defPPr>
+              <a:lvl1pPr marL="0" algn="l" defTabSz="1088776" rtl="0" eaLnBrk="1" latinLnBrk="0" hangingPunct="1">
+                <a:defRPr lang="de-DE" sz="2100" kern="1200">
+                  <a:solidFill>
+                    <a:schemeClr val="lt1"/>
+                  </a:solidFill>
+                  <a:latin typeface="+mn-lt"/>
+                  <a:ea typeface="+mn-ea"/>
+                  <a:cs typeface="+mn-cs"/>
+                </a:defRPr>
+              </a:lvl1pPr>
+              <a:lvl2pPr marL="544388" algn="l" defTabSz="1088776" rtl="0" eaLnBrk="1" latinLnBrk="0" hangingPunct="1">
+                <a:buClr>
+                  <a:srgbClr val="FDB913"/>
+                </a:buClr>
+                <a:buSzPct val="100000"/>
+                <a:buFont typeface="wingdings"/>
+                <a:buChar char=""/>
+                <a:defRPr lang="de-DE" sz="2100" kern="1200">
+                  <a:solidFill>
+                    <a:schemeClr val="lt1"/>
+                  </a:solidFill>
+                  <a:latin typeface="+mn-lt"/>
+                  <a:ea typeface="+mn-ea"/>
+                  <a:cs typeface="+mn-cs"/>
+                </a:defRPr>
+              </a:lvl2pPr>
+              <a:lvl3pPr marL="1088776" algn="l" defTabSz="1088776" rtl="0" eaLnBrk="1" latinLnBrk="0" hangingPunct="1">
+                <a:buClr>
+                  <a:srgbClr val="666666"/>
+                </a:buClr>
+                <a:buSzPct val="80000"/>
+                <a:buFont typeface="Wingdings"/>
+                <a:buChar char="n"/>
+                <a:defRPr lang="de-DE" sz="1700" kern="1200">
+                  <a:solidFill>
+                    <a:schemeClr val="lt1"/>
+                  </a:solidFill>
+                  <a:latin typeface="+mn-lt"/>
+                  <a:ea typeface="+mn-ea"/>
+                  <a:cs typeface="+mn-cs"/>
+                </a:defRPr>
+              </a:lvl3pPr>
+              <a:lvl4pPr marL="1633164" algn="l" defTabSz="1088776" rtl="0" eaLnBrk="1" latinLnBrk="0" hangingPunct="1">
+                <a:buClr>
+                  <a:srgbClr val="666666"/>
+                </a:buClr>
+                <a:buSzPct val="80000"/>
+                <a:buFont typeface="Arial"/>
+                <a:buChar char=""/>
+                <a:defRPr lang="de-DE" sz="1400" kern="1200">
+                  <a:solidFill>
+                    <a:schemeClr val="lt1"/>
+                  </a:solidFill>
+                  <a:latin typeface="+mn-lt"/>
+                  <a:ea typeface="+mn-ea"/>
+                  <a:cs typeface="+mn-cs"/>
+                </a:defRPr>
+              </a:lvl4pPr>
+              <a:lvl5pPr marL="2177552" algn="l" defTabSz="1088776" rtl="0" eaLnBrk="1" latinLnBrk="0" hangingPunct="1">
+                <a:buClr>
+                  <a:srgbClr val="666666"/>
+                </a:buClr>
+                <a:buSzPct val="80000"/>
+                <a:buFont typeface="Arial"/>
+                <a:buChar char=""/>
+                <a:defRPr lang="de-DE" sz="1200" kern="1200">
+                  <a:solidFill>
+                    <a:schemeClr val="lt1"/>
+                  </a:solidFill>
+                  <a:latin typeface="+mn-lt"/>
+                  <a:ea typeface="+mn-ea"/>
+                  <a:cs typeface="+mn-cs"/>
+                </a:defRPr>
+              </a:lvl5pPr>
+              <a:lvl6pPr marL="2721940" algn="l" defTabSz="1088776" rtl="0" eaLnBrk="1" latinLnBrk="0" hangingPunct="1">
+                <a:defRPr sz="2100" kern="1200">
+                  <a:solidFill>
+                    <a:schemeClr val="lt1"/>
+                  </a:solidFill>
+                  <a:latin typeface="+mn-lt"/>
+                  <a:ea typeface="+mn-ea"/>
+                  <a:cs typeface="+mn-cs"/>
+                </a:defRPr>
+              </a:lvl6pPr>
+              <a:lvl7pPr marL="3266328" algn="l" defTabSz="1088776" rtl="0" eaLnBrk="1" latinLnBrk="0" hangingPunct="1">
+                <a:defRPr sz="2100" kern="1200">
+                  <a:solidFill>
+                    <a:schemeClr val="lt1"/>
+                  </a:solidFill>
+                  <a:latin typeface="+mn-lt"/>
+                  <a:ea typeface="+mn-ea"/>
+                  <a:cs typeface="+mn-cs"/>
+                </a:defRPr>
+              </a:lvl7pPr>
+              <a:lvl8pPr marL="3810716" algn="l" defTabSz="1088776" rtl="0" eaLnBrk="1" latinLnBrk="0" hangingPunct="1">
+                <a:defRPr sz="2100" kern="1200">
+                  <a:solidFill>
+                    <a:schemeClr val="lt1"/>
+                  </a:solidFill>
+                  <a:latin typeface="+mn-lt"/>
+                  <a:ea typeface="+mn-ea"/>
+                  <a:cs typeface="+mn-cs"/>
+                </a:defRPr>
+              </a:lvl8pPr>
+              <a:lvl9pPr marL="4355104" algn="l" defTabSz="1088776" rtl="0" eaLnBrk="1" latinLnBrk="0" hangingPunct="1">
+                <a:defRPr sz="2100" kern="1200">
+                  <a:solidFill>
+                    <a:schemeClr val="lt1"/>
+                  </a:solidFill>
+                  <a:latin typeface="+mn-lt"/>
+                  <a:ea typeface="+mn-ea"/>
+                  <a:cs typeface="+mn-cs"/>
+                </a:defRPr>
+              </a:lvl9pPr>
+            </a:lstStyle>
+            <a:p>
+              <a:pPr algn="ctr" defTabSz="1088558" fontAlgn="base">
+                <a:spcBef>
+                  <a:spcPct val="50000"/>
+                </a:spcBef>
+                <a:spcAft>
+                  <a:spcPct val="0"/>
+                </a:spcAft>
+                <a:buClr>
+                  <a:srgbClr val="F0AB00"/>
+                </a:buClr>
+                <a:buSzPct val="80000"/>
+              </a:pPr>
+              <a:r>
+                <a:rPr lang="en-US" sz="1000" kern="0" dirty="0">
+                  <a:solidFill>
+                    <a:srgbClr val="000000"/>
+                  </a:solidFill>
+                  <a:latin typeface="Arial"/>
+                  <a:ea typeface="Arial Unicode MS" pitchFamily="34" charset="-128"/>
+                  <a:cs typeface="Arial Unicode MS" pitchFamily="34" charset="-128"/>
+                </a:rPr>
+                <a:t>sec</a:t>
+              </a:r>
+            </a:p>
+          </p:txBody>
+        </p:sp>
+        <p:pic>
+          <p:nvPicPr>
+            <p:cNvPr id="125" name="Picture 124">
+              <a:extLst>
+                <a:ext uri="{FF2B5EF4-FFF2-40B4-BE49-F238E27FC236}">
+                  <a16:creationId xmlns:a16="http://schemas.microsoft.com/office/drawing/2014/main" id="{2DCCAAB7-D199-4A4E-BD49-017292F659A6}"/>
+                </a:ext>
+              </a:extLst>
+            </p:cNvPr>
+            <p:cNvPicPr>
+              <a:picLocks noChangeAspect="1"/>
+            </p:cNvPicPr>
+            <p:nvPr/>
+          </p:nvPicPr>
+          <p:blipFill>
+            <a:blip r:embed="rId3"/>
+            <a:stretch>
+              <a:fillRect/>
+            </a:stretch>
+          </p:blipFill>
+          <p:spPr>
+            <a:xfrm>
+              <a:off x="3290175" y="4941991"/>
+              <a:ext cx="150305" cy="146304"/>
+            </a:xfrm>
+            <a:prstGeom prst="rect">
+              <a:avLst/>
+            </a:prstGeom>
+          </p:spPr>
+        </p:pic>
+      </p:grpSp>
     </p:spTree>
     <p:extLst>
       <p:ext uri="{BB962C8B-B14F-4D97-AF65-F5344CB8AC3E}">
@@ -37675,7 +38265,7 @@
                     <a:ea typeface="Arial Unicode MS" pitchFamily="34" charset="-128"/>
                     <a:cs typeface="Arial Unicode MS" pitchFamily="34" charset="-128"/>
                   </a:rPr>
-                  <a:t>cm</a:t>
+                  <a:t>sec</a:t>
                 </a:r>
               </a:p>
             </p:txBody>
@@ -38852,6 +39442,301 @@
             </a:fontRef>
           </p:style>
         </p:cxnSp>
+      </p:grpSp>
+      <p:grpSp>
+        <p:nvGrpSpPr>
+          <p:cNvPr id="106" name="Group 105">
+            <a:extLst>
+              <a:ext uri="{FF2B5EF4-FFF2-40B4-BE49-F238E27FC236}">
+                <a16:creationId xmlns:a16="http://schemas.microsoft.com/office/drawing/2014/main" id="{DEA569BE-4D63-4125-B5AC-6AD793C2CE20}"/>
+              </a:ext>
+            </a:extLst>
+          </p:cNvPr>
+          <p:cNvGrpSpPr/>
+          <p:nvPr/>
+        </p:nvGrpSpPr>
+        <p:grpSpPr>
+          <a:xfrm>
+            <a:off x="8367923" y="5466728"/>
+            <a:ext cx="643122" cy="358399"/>
+            <a:chOff x="2819071" y="4941991"/>
+            <a:chExt cx="643122" cy="358399"/>
+          </a:xfrm>
+          <a:solidFill>
+            <a:schemeClr val="bg1">
+              <a:lumMod val="50000"/>
+            </a:schemeClr>
+          </a:solidFill>
+        </p:grpSpPr>
+        <p:cxnSp>
+          <p:nvCxnSpPr>
+            <p:cNvPr id="108" name="Straight Connector 107">
+              <a:extLst>
+                <a:ext uri="{FF2B5EF4-FFF2-40B4-BE49-F238E27FC236}">
+                  <a16:creationId xmlns:a16="http://schemas.microsoft.com/office/drawing/2014/main" id="{77105893-ACA7-4D99-AFF1-79B2B626D608}"/>
+                </a:ext>
+              </a:extLst>
+            </p:cNvPr>
+            <p:cNvCxnSpPr>
+              <a:cxnSpLocks/>
+            </p:cNvCxnSpPr>
+            <p:nvPr/>
+          </p:nvCxnSpPr>
+          <p:spPr>
+            <a:xfrm>
+              <a:off x="3362585" y="5142991"/>
+              <a:ext cx="99608" cy="0"/>
+            </a:xfrm>
+            <a:prstGeom prst="line">
+              <a:avLst/>
+            </a:prstGeom>
+            <a:grpFill/>
+            <a:ln w="9525">
+              <a:solidFill>
+                <a:schemeClr val="tx1"/>
+              </a:solidFill>
+              <a:headEnd type="none" w="med" len="med"/>
+              <a:tailEnd type="none" w="med" len="med"/>
+            </a:ln>
+          </p:spPr>
+          <p:style>
+            <a:lnRef idx="1">
+              <a:schemeClr val="accent1"/>
+            </a:lnRef>
+            <a:fillRef idx="0">
+              <a:schemeClr val="accent1"/>
+            </a:fillRef>
+            <a:effectRef idx="0">
+              <a:schemeClr val="accent1"/>
+            </a:effectRef>
+            <a:fontRef idx="minor">
+              <a:schemeClr val="tx1"/>
+            </a:fontRef>
+          </p:style>
+        </p:cxnSp>
+        <p:sp>
+          <p:nvSpPr>
+            <p:cNvPr id="109" name="Rounded Rectangle 14">
+              <a:extLst>
+                <a:ext uri="{FF2B5EF4-FFF2-40B4-BE49-F238E27FC236}">
+                  <a16:creationId xmlns:a16="http://schemas.microsoft.com/office/drawing/2014/main" id="{88C93575-DAEB-43C3-A906-CDF2545FA19D}"/>
+                </a:ext>
+              </a:extLst>
+            </p:cNvPr>
+            <p:cNvSpPr/>
+            <p:nvPr/>
+          </p:nvSpPr>
+          <p:spPr bwMode="gray">
+            <a:xfrm>
+              <a:off x="2819071" y="5005920"/>
+              <a:ext cx="548827" cy="294470"/>
+            </a:xfrm>
+            <a:prstGeom prst="roundRect">
+              <a:avLst/>
+            </a:prstGeom>
+            <a:grpFill/>
+            <a:ln>
+              <a:solidFill>
+                <a:schemeClr val="tx1"/>
+              </a:solidFill>
+              <a:headEnd/>
+              <a:tailEnd/>
+            </a:ln>
+            <a:effectLst/>
+          </p:spPr>
+          <p:style>
+            <a:lnRef idx="1">
+              <a:schemeClr val="accent1"/>
+            </a:lnRef>
+            <a:fillRef idx="3">
+              <a:schemeClr val="accent1"/>
+            </a:fillRef>
+            <a:effectRef idx="2">
+              <a:schemeClr val="accent1"/>
+            </a:effectRef>
+            <a:fontRef idx="minor">
+              <a:schemeClr val="lt1"/>
+            </a:fontRef>
+          </p:style>
+          <p:txBody>
+            <a:bodyPr lIns="107138" tIns="85710" rIns="107138" bIns="85710" rtlCol="0" anchor="t" anchorCtr="0"/>
+            <a:lstStyle>
+              <a:defPPr>
+                <a:defRPr lang="de-DE"/>
+              </a:defPPr>
+              <a:lvl1pPr marL="0" algn="l" defTabSz="1088776" rtl="0" eaLnBrk="1" latinLnBrk="0" hangingPunct="1">
+                <a:defRPr lang="de-DE" sz="2100" kern="1200">
+                  <a:solidFill>
+                    <a:schemeClr val="lt1"/>
+                  </a:solidFill>
+                  <a:latin typeface="+mn-lt"/>
+                  <a:ea typeface="+mn-ea"/>
+                  <a:cs typeface="+mn-cs"/>
+                </a:defRPr>
+              </a:lvl1pPr>
+              <a:lvl2pPr marL="544388" algn="l" defTabSz="1088776" rtl="0" eaLnBrk="1" latinLnBrk="0" hangingPunct="1">
+                <a:buClr>
+                  <a:srgbClr val="FDB913"/>
+                </a:buClr>
+                <a:buSzPct val="100000"/>
+                <a:buFont typeface="wingdings"/>
+                <a:buChar char=""/>
+                <a:defRPr lang="de-DE" sz="2100" kern="1200">
+                  <a:solidFill>
+                    <a:schemeClr val="lt1"/>
+                  </a:solidFill>
+                  <a:latin typeface="+mn-lt"/>
+                  <a:ea typeface="+mn-ea"/>
+                  <a:cs typeface="+mn-cs"/>
+                </a:defRPr>
+              </a:lvl2pPr>
+              <a:lvl3pPr marL="1088776" algn="l" defTabSz="1088776" rtl="0" eaLnBrk="1" latinLnBrk="0" hangingPunct="1">
+                <a:buClr>
+                  <a:srgbClr val="666666"/>
+                </a:buClr>
+                <a:buSzPct val="80000"/>
+                <a:buFont typeface="Wingdings"/>
+                <a:buChar char="n"/>
+                <a:defRPr lang="de-DE" sz="1700" kern="1200">
+                  <a:solidFill>
+                    <a:schemeClr val="lt1"/>
+                  </a:solidFill>
+                  <a:latin typeface="+mn-lt"/>
+                  <a:ea typeface="+mn-ea"/>
+                  <a:cs typeface="+mn-cs"/>
+                </a:defRPr>
+              </a:lvl3pPr>
+              <a:lvl4pPr marL="1633164" algn="l" defTabSz="1088776" rtl="0" eaLnBrk="1" latinLnBrk="0" hangingPunct="1">
+                <a:buClr>
+                  <a:srgbClr val="666666"/>
+                </a:buClr>
+                <a:buSzPct val="80000"/>
+                <a:buFont typeface="Arial"/>
+                <a:buChar char=""/>
+                <a:defRPr lang="de-DE" sz="1400" kern="1200">
+                  <a:solidFill>
+                    <a:schemeClr val="lt1"/>
+                  </a:solidFill>
+                  <a:latin typeface="+mn-lt"/>
+                  <a:ea typeface="+mn-ea"/>
+                  <a:cs typeface="+mn-cs"/>
+                </a:defRPr>
+              </a:lvl4pPr>
+              <a:lvl5pPr marL="2177552" algn="l" defTabSz="1088776" rtl="0" eaLnBrk="1" latinLnBrk="0" hangingPunct="1">
+                <a:buClr>
+                  <a:srgbClr val="666666"/>
+                </a:buClr>
+                <a:buSzPct val="80000"/>
+                <a:buFont typeface="Arial"/>
+                <a:buChar char=""/>
+                <a:defRPr lang="de-DE" sz="1200" kern="1200">
+                  <a:solidFill>
+                    <a:schemeClr val="lt1"/>
+                  </a:solidFill>
+                  <a:latin typeface="+mn-lt"/>
+                  <a:ea typeface="+mn-ea"/>
+                  <a:cs typeface="+mn-cs"/>
+                </a:defRPr>
+              </a:lvl5pPr>
+              <a:lvl6pPr marL="2721940" algn="l" defTabSz="1088776" rtl="0" eaLnBrk="1" latinLnBrk="0" hangingPunct="1">
+                <a:defRPr sz="2100" kern="1200">
+                  <a:solidFill>
+                    <a:schemeClr val="lt1"/>
+                  </a:solidFill>
+                  <a:latin typeface="+mn-lt"/>
+                  <a:ea typeface="+mn-ea"/>
+                  <a:cs typeface="+mn-cs"/>
+                </a:defRPr>
+              </a:lvl6pPr>
+              <a:lvl7pPr marL="3266328" algn="l" defTabSz="1088776" rtl="0" eaLnBrk="1" latinLnBrk="0" hangingPunct="1">
+                <a:defRPr sz="2100" kern="1200">
+                  <a:solidFill>
+                    <a:schemeClr val="lt1"/>
+                  </a:solidFill>
+                  <a:latin typeface="+mn-lt"/>
+                  <a:ea typeface="+mn-ea"/>
+                  <a:cs typeface="+mn-cs"/>
+                </a:defRPr>
+              </a:lvl7pPr>
+              <a:lvl8pPr marL="3810716" algn="l" defTabSz="1088776" rtl="0" eaLnBrk="1" latinLnBrk="0" hangingPunct="1">
+                <a:defRPr sz="2100" kern="1200">
+                  <a:solidFill>
+                    <a:schemeClr val="lt1"/>
+                  </a:solidFill>
+                  <a:latin typeface="+mn-lt"/>
+                  <a:ea typeface="+mn-ea"/>
+                  <a:cs typeface="+mn-cs"/>
+                </a:defRPr>
+              </a:lvl8pPr>
+              <a:lvl9pPr marL="4355104" algn="l" defTabSz="1088776" rtl="0" eaLnBrk="1" latinLnBrk="0" hangingPunct="1">
+                <a:defRPr sz="2100" kern="1200">
+                  <a:solidFill>
+                    <a:schemeClr val="lt1"/>
+                  </a:solidFill>
+                  <a:latin typeface="+mn-lt"/>
+                  <a:ea typeface="+mn-ea"/>
+                  <a:cs typeface="+mn-cs"/>
+                </a:defRPr>
+              </a:lvl9pPr>
+            </a:lstStyle>
+            <a:p>
+              <a:pPr algn="ctr" defTabSz="1088558" fontAlgn="base">
+                <a:spcBef>
+                  <a:spcPct val="50000"/>
+                </a:spcBef>
+                <a:spcAft>
+                  <a:spcPct val="0"/>
+                </a:spcAft>
+                <a:buClr>
+                  <a:srgbClr val="F0AB00"/>
+                </a:buClr>
+                <a:buSzPct val="80000"/>
+              </a:pPr>
+              <a:r>
+                <a:rPr lang="en-US" sz="1000" kern="0" dirty="0">
+                  <a:solidFill>
+                    <a:srgbClr val="000000"/>
+                  </a:solidFill>
+                  <a:latin typeface="Arial"/>
+                  <a:ea typeface="Arial Unicode MS" pitchFamily="34" charset="-128"/>
+                  <a:cs typeface="Arial Unicode MS" pitchFamily="34" charset="-128"/>
+                </a:rPr>
+                <a:t>sec</a:t>
+              </a:r>
+            </a:p>
+          </p:txBody>
+        </p:sp>
+        <p:pic>
+          <p:nvPicPr>
+            <p:cNvPr id="110" name="Picture 109">
+              <a:extLst>
+                <a:ext uri="{FF2B5EF4-FFF2-40B4-BE49-F238E27FC236}">
+                  <a16:creationId xmlns:a16="http://schemas.microsoft.com/office/drawing/2014/main" id="{30E236B8-F8AD-43B0-AC19-4852E09A4BA6}"/>
+                </a:ext>
+              </a:extLst>
+            </p:cNvPr>
+            <p:cNvPicPr>
+              <a:picLocks noChangeAspect="1"/>
+            </p:cNvPicPr>
+            <p:nvPr/>
+          </p:nvPicPr>
+          <p:blipFill>
+            <a:blip r:embed="rId7"/>
+            <a:stretch>
+              <a:fillRect/>
+            </a:stretch>
+          </p:blipFill>
+          <p:spPr>
+            <a:xfrm>
+              <a:off x="3290175" y="4941991"/>
+              <a:ext cx="150305" cy="146304"/>
+            </a:xfrm>
+            <a:prstGeom prst="rect">
+              <a:avLst/>
+            </a:prstGeom>
+            <a:noFill/>
+          </p:spPr>
+        </p:pic>
       </p:grpSp>
     </p:spTree>
     <p:extLst>
@@ -45067,7 +45952,9 @@
               <a:prstGeom prst="roundRect">
                 <a:avLst/>
               </a:prstGeom>
-              <a:grpFill/>
+              <a:solidFill>
+                <a:srgbClr val="4CC5FF"/>
+              </a:solidFill>
               <a:ln>
                 <a:solidFill>
                   <a:schemeClr val="tx1"/>
@@ -45293,7 +46180,7 @@
                     <a:ea typeface="Arial Unicode MS" pitchFamily="34" charset="-128"/>
                     <a:cs typeface="Arial Unicode MS" pitchFamily="34" charset="-128"/>
                   </a:rPr>
-                  <a:t>cm</a:t>
+                  <a:t>sec</a:t>
                 </a:r>
               </a:p>
             </p:txBody>
@@ -46670,6 +47557,298 @@
             </a:fontRef>
           </p:style>
         </p:cxnSp>
+      </p:grpSp>
+      <p:grpSp>
+        <p:nvGrpSpPr>
+          <p:cNvPr id="107" name="Group 106">
+            <a:extLst>
+              <a:ext uri="{FF2B5EF4-FFF2-40B4-BE49-F238E27FC236}">
+                <a16:creationId xmlns:a16="http://schemas.microsoft.com/office/drawing/2014/main" id="{26BC45FE-4B01-4D7C-B1F5-A3D50B95CDE0}"/>
+              </a:ext>
+            </a:extLst>
+          </p:cNvPr>
+          <p:cNvGrpSpPr/>
+          <p:nvPr/>
+        </p:nvGrpSpPr>
+        <p:grpSpPr>
+          <a:xfrm>
+            <a:off x="8341611" y="5466728"/>
+            <a:ext cx="643122" cy="358399"/>
+            <a:chOff x="2819071" y="4941991"/>
+            <a:chExt cx="643122" cy="358399"/>
+          </a:xfrm>
+        </p:grpSpPr>
+        <p:cxnSp>
+          <p:nvCxnSpPr>
+            <p:cNvPr id="113" name="Straight Connector 112">
+              <a:extLst>
+                <a:ext uri="{FF2B5EF4-FFF2-40B4-BE49-F238E27FC236}">
+                  <a16:creationId xmlns:a16="http://schemas.microsoft.com/office/drawing/2014/main" id="{6DE12B0D-FB91-45F3-BE82-70D39F87662B}"/>
+                </a:ext>
+              </a:extLst>
+            </p:cNvPr>
+            <p:cNvCxnSpPr>
+              <a:cxnSpLocks/>
+            </p:cNvCxnSpPr>
+            <p:nvPr/>
+          </p:nvCxnSpPr>
+          <p:spPr>
+            <a:xfrm>
+              <a:off x="3362585" y="5142991"/>
+              <a:ext cx="99608" cy="0"/>
+            </a:xfrm>
+            <a:prstGeom prst="line">
+              <a:avLst/>
+            </a:prstGeom>
+            <a:ln w="9525">
+              <a:solidFill>
+                <a:schemeClr val="tx1"/>
+              </a:solidFill>
+              <a:headEnd type="none" w="med" len="med"/>
+              <a:tailEnd type="none" w="med" len="med"/>
+            </a:ln>
+          </p:spPr>
+          <p:style>
+            <a:lnRef idx="1">
+              <a:schemeClr val="accent1"/>
+            </a:lnRef>
+            <a:fillRef idx="0">
+              <a:schemeClr val="accent1"/>
+            </a:fillRef>
+            <a:effectRef idx="0">
+              <a:schemeClr val="accent1"/>
+            </a:effectRef>
+            <a:fontRef idx="minor">
+              <a:schemeClr val="tx1"/>
+            </a:fontRef>
+          </p:style>
+        </p:cxnSp>
+        <p:sp>
+          <p:nvSpPr>
+            <p:cNvPr id="115" name="Rounded Rectangle 14">
+              <a:extLst>
+                <a:ext uri="{FF2B5EF4-FFF2-40B4-BE49-F238E27FC236}">
+                  <a16:creationId xmlns:a16="http://schemas.microsoft.com/office/drawing/2014/main" id="{CA610347-F30B-4406-A90D-BE2CED2809A4}"/>
+                </a:ext>
+              </a:extLst>
+            </p:cNvPr>
+            <p:cNvSpPr/>
+            <p:nvPr/>
+          </p:nvSpPr>
+          <p:spPr bwMode="gray">
+            <a:xfrm>
+              <a:off x="2819071" y="5005920"/>
+              <a:ext cx="548827" cy="294470"/>
+            </a:xfrm>
+            <a:prstGeom prst="roundRect">
+              <a:avLst/>
+            </a:prstGeom>
+            <a:solidFill>
+              <a:schemeClr val="bg1">
+                <a:lumMod val="50000"/>
+              </a:schemeClr>
+            </a:solidFill>
+            <a:ln>
+              <a:solidFill>
+                <a:schemeClr val="tx1"/>
+              </a:solidFill>
+              <a:headEnd/>
+              <a:tailEnd/>
+            </a:ln>
+            <a:effectLst/>
+          </p:spPr>
+          <p:style>
+            <a:lnRef idx="1">
+              <a:schemeClr val="accent1"/>
+            </a:lnRef>
+            <a:fillRef idx="3">
+              <a:schemeClr val="accent1"/>
+            </a:fillRef>
+            <a:effectRef idx="2">
+              <a:schemeClr val="accent1"/>
+            </a:effectRef>
+            <a:fontRef idx="minor">
+              <a:schemeClr val="lt1"/>
+            </a:fontRef>
+          </p:style>
+          <p:txBody>
+            <a:bodyPr lIns="107138" tIns="85710" rIns="107138" bIns="85710" rtlCol="0" anchor="t" anchorCtr="0"/>
+            <a:lstStyle>
+              <a:defPPr>
+                <a:defRPr lang="de-DE"/>
+              </a:defPPr>
+              <a:lvl1pPr marL="0" algn="l" defTabSz="1088776" rtl="0" eaLnBrk="1" latinLnBrk="0" hangingPunct="1">
+                <a:defRPr lang="de-DE" sz="2100" kern="1200">
+                  <a:solidFill>
+                    <a:schemeClr val="lt1"/>
+                  </a:solidFill>
+                  <a:latin typeface="+mn-lt"/>
+                  <a:ea typeface="+mn-ea"/>
+                  <a:cs typeface="+mn-cs"/>
+                </a:defRPr>
+              </a:lvl1pPr>
+              <a:lvl2pPr marL="544388" algn="l" defTabSz="1088776" rtl="0" eaLnBrk="1" latinLnBrk="0" hangingPunct="1">
+                <a:buClr>
+                  <a:srgbClr val="FDB913"/>
+                </a:buClr>
+                <a:buSzPct val="100000"/>
+                <a:buFont typeface="wingdings"/>
+                <a:buChar char=""/>
+                <a:defRPr lang="de-DE" sz="2100" kern="1200">
+                  <a:solidFill>
+                    <a:schemeClr val="lt1"/>
+                  </a:solidFill>
+                  <a:latin typeface="+mn-lt"/>
+                  <a:ea typeface="+mn-ea"/>
+                  <a:cs typeface="+mn-cs"/>
+                </a:defRPr>
+              </a:lvl2pPr>
+              <a:lvl3pPr marL="1088776" algn="l" defTabSz="1088776" rtl="0" eaLnBrk="1" latinLnBrk="0" hangingPunct="1">
+                <a:buClr>
+                  <a:srgbClr val="666666"/>
+                </a:buClr>
+                <a:buSzPct val="80000"/>
+                <a:buFont typeface="Wingdings"/>
+                <a:buChar char="n"/>
+                <a:defRPr lang="de-DE" sz="1700" kern="1200">
+                  <a:solidFill>
+                    <a:schemeClr val="lt1"/>
+                  </a:solidFill>
+                  <a:latin typeface="+mn-lt"/>
+                  <a:ea typeface="+mn-ea"/>
+                  <a:cs typeface="+mn-cs"/>
+                </a:defRPr>
+              </a:lvl3pPr>
+              <a:lvl4pPr marL="1633164" algn="l" defTabSz="1088776" rtl="0" eaLnBrk="1" latinLnBrk="0" hangingPunct="1">
+                <a:buClr>
+                  <a:srgbClr val="666666"/>
+                </a:buClr>
+                <a:buSzPct val="80000"/>
+                <a:buFont typeface="Arial"/>
+                <a:buChar char=""/>
+                <a:defRPr lang="de-DE" sz="1400" kern="1200">
+                  <a:solidFill>
+                    <a:schemeClr val="lt1"/>
+                  </a:solidFill>
+                  <a:latin typeface="+mn-lt"/>
+                  <a:ea typeface="+mn-ea"/>
+                  <a:cs typeface="+mn-cs"/>
+                </a:defRPr>
+              </a:lvl4pPr>
+              <a:lvl5pPr marL="2177552" algn="l" defTabSz="1088776" rtl="0" eaLnBrk="1" latinLnBrk="0" hangingPunct="1">
+                <a:buClr>
+                  <a:srgbClr val="666666"/>
+                </a:buClr>
+                <a:buSzPct val="80000"/>
+                <a:buFont typeface="Arial"/>
+                <a:buChar char=""/>
+                <a:defRPr lang="de-DE" sz="1200" kern="1200">
+                  <a:solidFill>
+                    <a:schemeClr val="lt1"/>
+                  </a:solidFill>
+                  <a:latin typeface="+mn-lt"/>
+                  <a:ea typeface="+mn-ea"/>
+                  <a:cs typeface="+mn-cs"/>
+                </a:defRPr>
+              </a:lvl5pPr>
+              <a:lvl6pPr marL="2721940" algn="l" defTabSz="1088776" rtl="0" eaLnBrk="1" latinLnBrk="0" hangingPunct="1">
+                <a:defRPr sz="2100" kern="1200">
+                  <a:solidFill>
+                    <a:schemeClr val="lt1"/>
+                  </a:solidFill>
+                  <a:latin typeface="+mn-lt"/>
+                  <a:ea typeface="+mn-ea"/>
+                  <a:cs typeface="+mn-cs"/>
+                </a:defRPr>
+              </a:lvl6pPr>
+              <a:lvl7pPr marL="3266328" algn="l" defTabSz="1088776" rtl="0" eaLnBrk="1" latinLnBrk="0" hangingPunct="1">
+                <a:defRPr sz="2100" kern="1200">
+                  <a:solidFill>
+                    <a:schemeClr val="lt1"/>
+                  </a:solidFill>
+                  <a:latin typeface="+mn-lt"/>
+                  <a:ea typeface="+mn-ea"/>
+                  <a:cs typeface="+mn-cs"/>
+                </a:defRPr>
+              </a:lvl7pPr>
+              <a:lvl8pPr marL="3810716" algn="l" defTabSz="1088776" rtl="0" eaLnBrk="1" latinLnBrk="0" hangingPunct="1">
+                <a:defRPr sz="2100" kern="1200">
+                  <a:solidFill>
+                    <a:schemeClr val="lt1"/>
+                  </a:solidFill>
+                  <a:latin typeface="+mn-lt"/>
+                  <a:ea typeface="+mn-ea"/>
+                  <a:cs typeface="+mn-cs"/>
+                </a:defRPr>
+              </a:lvl8pPr>
+              <a:lvl9pPr marL="4355104" algn="l" defTabSz="1088776" rtl="0" eaLnBrk="1" latinLnBrk="0" hangingPunct="1">
+                <a:defRPr sz="2100" kern="1200">
+                  <a:solidFill>
+                    <a:schemeClr val="lt1"/>
+                  </a:solidFill>
+                  <a:latin typeface="+mn-lt"/>
+                  <a:ea typeface="+mn-ea"/>
+                  <a:cs typeface="+mn-cs"/>
+                </a:defRPr>
+              </a:lvl9pPr>
+            </a:lstStyle>
+            <a:p>
+              <a:pPr algn="ctr" defTabSz="1088558" fontAlgn="base">
+                <a:spcBef>
+                  <a:spcPct val="50000"/>
+                </a:spcBef>
+                <a:spcAft>
+                  <a:spcPct val="0"/>
+                </a:spcAft>
+                <a:buClr>
+                  <a:srgbClr val="F0AB00"/>
+                </a:buClr>
+                <a:buSzPct val="80000"/>
+              </a:pPr>
+              <a:r>
+                <a:rPr lang="en-US" sz="1000" kern="0" dirty="0">
+                  <a:solidFill>
+                    <a:srgbClr val="000000"/>
+                  </a:solidFill>
+                  <a:latin typeface="Arial"/>
+                  <a:ea typeface="Arial Unicode MS" pitchFamily="34" charset="-128"/>
+                  <a:cs typeface="Arial Unicode MS" pitchFamily="34" charset="-128"/>
+                </a:rPr>
+                <a:t>sec</a:t>
+              </a:r>
+            </a:p>
+          </p:txBody>
+        </p:sp>
+        <p:pic>
+          <p:nvPicPr>
+            <p:cNvPr id="117" name="Picture 116">
+              <a:extLst>
+                <a:ext uri="{FF2B5EF4-FFF2-40B4-BE49-F238E27FC236}">
+                  <a16:creationId xmlns:a16="http://schemas.microsoft.com/office/drawing/2014/main" id="{AF5BDA71-0969-4A14-A9C0-3BA75D9D6BED}"/>
+                </a:ext>
+              </a:extLst>
+            </p:cNvPr>
+            <p:cNvPicPr>
+              <a:picLocks noChangeAspect="1"/>
+            </p:cNvPicPr>
+            <p:nvPr/>
+          </p:nvPicPr>
+          <p:blipFill>
+            <a:blip r:embed="rId3"/>
+            <a:stretch>
+              <a:fillRect/>
+            </a:stretch>
+          </p:blipFill>
+          <p:spPr>
+            <a:xfrm>
+              <a:off x="3290175" y="4941991"/>
+              <a:ext cx="150305" cy="146304"/>
+            </a:xfrm>
+            <a:prstGeom prst="rect">
+              <a:avLst/>
+            </a:prstGeom>
+          </p:spPr>
+        </p:pic>
       </p:grpSp>
     </p:spTree>
     <p:extLst>

</xml_diff>

<commit_message>
arrows & copyright update
</commit_message>
<xml_diff>
--- a/sample-app/bulletinboard-in-k8s_exercises.pptx
+++ b/sample-app/bulletinboard-in-k8s_exercises.pptx
@@ -15498,7 +15498,7 @@
                   <a:schemeClr val="tx1"/>
                 </a:solidFill>
               </a:rPr>
-              <a:t>2018 SAP SE or an SAP affiliate company. All rights reserved.  </a:t>
+              <a:t>2020 SAP SE or an SAP affiliate company. All rights reserved.  </a:t>
             </a:r>
             <a:r>
               <a:rPr kumimoji="0" lang="en-US" sz="600" b="0" i="0" u="none" kern="0" baseline="0" dirty="0">
@@ -21808,6 +21808,55 @@
           </p:spPr>
         </p:pic>
       </p:grpSp>
+      <p:cxnSp>
+        <p:nvCxnSpPr>
+          <p:cNvPr id="116" name="Connector: Elbow 115">
+            <a:extLst>
+              <a:ext uri="{FF2B5EF4-FFF2-40B4-BE49-F238E27FC236}">
+                <a16:creationId xmlns:a16="http://schemas.microsoft.com/office/drawing/2014/main" id="{66B30BE7-6875-4BDC-A497-8B0622C4D795}"/>
+              </a:ext>
+            </a:extLst>
+          </p:cNvPr>
+          <p:cNvCxnSpPr>
+            <a:cxnSpLocks/>
+            <a:endCxn id="195" idx="1"/>
+          </p:cNvCxnSpPr>
+          <p:nvPr/>
+        </p:nvCxnSpPr>
+        <p:spPr>
+          <a:xfrm flipV="1">
+            <a:off x="7177286" y="1793525"/>
+            <a:ext cx="2712095" cy="1118464"/>
+          </a:xfrm>
+          <a:prstGeom prst="bentConnector3">
+            <a:avLst>
+              <a:gd name="adj1" fmla="val 37051"/>
+            </a:avLst>
+          </a:prstGeom>
+          <a:grpFill/>
+          <a:ln w="38100">
+            <a:solidFill>
+              <a:schemeClr val="accent1"/>
+            </a:solidFill>
+            <a:headEnd type="none" w="med" len="med"/>
+            <a:tailEnd type="triangle" w="med" len="med"/>
+          </a:ln>
+        </p:spPr>
+        <p:style>
+          <a:lnRef idx="1">
+            <a:schemeClr val="accent1"/>
+          </a:lnRef>
+          <a:fillRef idx="0">
+            <a:schemeClr val="accent1"/>
+          </a:fillRef>
+          <a:effectRef idx="0">
+            <a:schemeClr val="accent1"/>
+          </a:effectRef>
+          <a:fontRef idx="minor">
+            <a:schemeClr val="tx1"/>
+          </a:fontRef>
+        </p:style>
+      </p:cxnSp>
     </p:spTree>
     <p:extLst>
       <p:ext uri="{BB962C8B-B14F-4D97-AF65-F5344CB8AC3E}">
@@ -28032,6 +28081,55 @@
           </p:spPr>
         </p:pic>
       </p:grpSp>
+      <p:cxnSp>
+        <p:nvCxnSpPr>
+          <p:cNvPr id="127" name="Connector: Elbow 126">
+            <a:extLst>
+              <a:ext uri="{FF2B5EF4-FFF2-40B4-BE49-F238E27FC236}">
+                <a16:creationId xmlns:a16="http://schemas.microsoft.com/office/drawing/2014/main" id="{B7BF7669-4DB5-4B5C-B8B5-EB7564F2AAF8}"/>
+              </a:ext>
+            </a:extLst>
+          </p:cNvPr>
+          <p:cNvCxnSpPr>
+            <a:cxnSpLocks/>
+            <a:endCxn id="273" idx="1"/>
+          </p:cNvCxnSpPr>
+          <p:nvPr/>
+        </p:nvCxnSpPr>
+        <p:spPr>
+          <a:xfrm flipV="1">
+            <a:off x="7177286" y="1788330"/>
+            <a:ext cx="2712707" cy="1123660"/>
+          </a:xfrm>
+          <a:prstGeom prst="bentConnector3">
+            <a:avLst>
+              <a:gd name="adj1" fmla="val 38031"/>
+            </a:avLst>
+          </a:prstGeom>
+          <a:grpFill/>
+          <a:ln w="38100">
+            <a:solidFill>
+              <a:schemeClr val="accent1"/>
+            </a:solidFill>
+            <a:headEnd type="none" w="med" len="med"/>
+            <a:tailEnd type="triangle" w="med" len="med"/>
+          </a:ln>
+        </p:spPr>
+        <p:style>
+          <a:lnRef idx="1">
+            <a:schemeClr val="accent1"/>
+          </a:lnRef>
+          <a:fillRef idx="0">
+            <a:schemeClr val="accent1"/>
+          </a:fillRef>
+          <a:effectRef idx="0">
+            <a:schemeClr val="accent1"/>
+          </a:effectRef>
+          <a:fontRef idx="minor">
+            <a:schemeClr val="tx1"/>
+          </a:fontRef>
+        </p:style>
+      </p:cxnSp>
     </p:spTree>
     <p:extLst>
       <p:ext uri="{BB962C8B-B14F-4D97-AF65-F5344CB8AC3E}">
@@ -39722,6 +39820,58 @@
           </p:spPr>
         </p:pic>
       </p:grpSp>
+      <p:cxnSp>
+        <p:nvCxnSpPr>
+          <p:cNvPr id="133" name="Connector: Elbow 132">
+            <a:extLst>
+              <a:ext uri="{FF2B5EF4-FFF2-40B4-BE49-F238E27FC236}">
+                <a16:creationId xmlns:a16="http://schemas.microsoft.com/office/drawing/2014/main" id="{69FF3169-B19C-4571-9C13-4C81F9FE3BF0}"/>
+              </a:ext>
+            </a:extLst>
+          </p:cNvPr>
+          <p:cNvCxnSpPr>
+            <a:cxnSpLocks/>
+            <a:stCxn id="155" idx="3"/>
+            <a:endCxn id="190" idx="1"/>
+          </p:cNvCxnSpPr>
+          <p:nvPr/>
+        </p:nvCxnSpPr>
+        <p:spPr>
+          <a:xfrm flipV="1">
+            <a:off x="7206260" y="1800100"/>
+            <a:ext cx="2693378" cy="1111889"/>
+          </a:xfrm>
+          <a:prstGeom prst="bentConnector3">
+            <a:avLst>
+              <a:gd name="adj1" fmla="val 36223"/>
+            </a:avLst>
+          </a:prstGeom>
+          <a:ln w="44450">
+            <a:solidFill>
+              <a:schemeClr val="tx1">
+                <a:lumMod val="65000"/>
+                <a:lumOff val="35000"/>
+              </a:schemeClr>
+            </a:solidFill>
+            <a:headEnd type="none" w="med" len="med"/>
+            <a:tailEnd type="triangle"/>
+          </a:ln>
+        </p:spPr>
+        <p:style>
+          <a:lnRef idx="1">
+            <a:schemeClr val="accent1"/>
+          </a:lnRef>
+          <a:fillRef idx="0">
+            <a:schemeClr val="accent1"/>
+          </a:fillRef>
+          <a:effectRef idx="0">
+            <a:schemeClr val="accent1"/>
+          </a:effectRef>
+          <a:fontRef idx="minor">
+            <a:schemeClr val="tx1"/>
+          </a:fontRef>
+        </p:style>
+      </p:cxnSp>
     </p:spTree>
     <p:extLst>
       <p:ext uri="{BB962C8B-B14F-4D97-AF65-F5344CB8AC3E}">

</xml_diff>